<commit_message>
Update Funciton-Point from Thi and readme from Nhan
</commit_message>
<xml_diff>
--- a/FILE_BAO_CAO/Funciton-Point .pptx
+++ b/FILE_BAO_CAO/Funciton-Point .pptx
@@ -481,7 +481,7 @@
             <a:fld id="{B61BEF0D-F0BB-DE4B-95CE-6DB70DBA9567}" type="datetimeFigureOut">
               <a:rPr lang="en-US" dirty="0"/>
               <a:pPr/>
-              <a:t>4/22/2018</a:t>
+              <a:t>4/23/2018</a:t>
             </a:fld>
             <a:endParaRPr lang="en-US" dirty="0"/>
           </a:p>
@@ -802,7 +802,7 @@
             <a:fld id="{B61BEF0D-F0BB-DE4B-95CE-6DB70DBA9567}" type="datetimeFigureOut">
               <a:rPr lang="en-US" dirty="0"/>
               <a:pPr/>
-              <a:t>4/22/2018</a:t>
+              <a:t>4/23/2018</a:t>
             </a:fld>
             <a:endParaRPr lang="en-US" dirty="0"/>
           </a:p>
@@ -1047,7 +1047,7 @@
             <a:fld id="{B61BEF0D-F0BB-DE4B-95CE-6DB70DBA9567}" type="datetimeFigureOut">
               <a:rPr lang="en-US" dirty="0"/>
               <a:pPr/>
-              <a:t>4/22/2018</a:t>
+              <a:t>4/23/2018</a:t>
             </a:fld>
             <a:endParaRPr lang="en-US" dirty="0"/>
           </a:p>
@@ -1383,7 +1383,7 @@
             <a:fld id="{B61BEF0D-F0BB-DE4B-95CE-6DB70DBA9567}" type="datetimeFigureOut">
               <a:rPr lang="en-US" dirty="0"/>
               <a:pPr/>
-              <a:t>4/22/2018</a:t>
+              <a:t>4/23/2018</a:t>
             </a:fld>
             <a:endParaRPr lang="en-US" dirty="0"/>
           </a:p>
@@ -1727,7 +1727,7 @@
             <a:fld id="{B61BEF0D-F0BB-DE4B-95CE-6DB70DBA9567}" type="datetimeFigureOut">
               <a:rPr lang="en-US" dirty="0"/>
               <a:pPr/>
-              <a:t>4/22/2018</a:t>
+              <a:t>4/23/2018</a:t>
             </a:fld>
             <a:endParaRPr lang="en-US" dirty="0"/>
           </a:p>
@@ -2098,7 +2098,7 @@
             <a:fld id="{B61BEF0D-F0BB-DE4B-95CE-6DB70DBA9567}" type="datetimeFigureOut">
               <a:rPr lang="en-US" dirty="0"/>
               <a:pPr/>
-              <a:t>4/22/2018</a:t>
+              <a:t>4/23/2018</a:t>
             </a:fld>
             <a:endParaRPr lang="en-US" dirty="0"/>
           </a:p>
@@ -2565,7 +2565,7 @@
             <a:fld id="{B61BEF0D-F0BB-DE4B-95CE-6DB70DBA9567}" type="datetimeFigureOut">
               <a:rPr lang="en-US" dirty="0"/>
               <a:pPr/>
-              <a:t>4/22/2018</a:t>
+              <a:t>4/23/2018</a:t>
             </a:fld>
             <a:endParaRPr lang="en-US" dirty="0"/>
           </a:p>
@@ -2767,7 +2767,7 @@
             <a:fld id="{B61BEF0D-F0BB-DE4B-95CE-6DB70DBA9567}" type="datetimeFigureOut">
               <a:rPr lang="en-US" dirty="0"/>
               <a:pPr/>
-              <a:t>4/22/2018</a:t>
+              <a:t>4/23/2018</a:t>
             </a:fld>
             <a:endParaRPr lang="en-US" dirty="0"/>
           </a:p>
@@ -2975,7 +2975,7 @@
             <a:fld id="{B61BEF0D-F0BB-DE4B-95CE-6DB70DBA9567}" type="datetimeFigureOut">
               <a:rPr lang="en-US" dirty="0"/>
               <a:pPr/>
-              <a:t>4/22/2018</a:t>
+              <a:t>4/23/2018</a:t>
             </a:fld>
             <a:endParaRPr lang="en-US" dirty="0"/>
           </a:p>
@@ -3203,7 +3203,7 @@
           <a:p>
             <a:fld id="{52647F38-B617-4D2F-AE0A-013F0C4D2C57}" type="datetimeFigureOut">
               <a:rPr lang="en-US" dirty="0"/>
-              <a:t>4/22/2018</a:t>
+              <a:t>4/23/2018</a:t>
             </a:fld>
             <a:endParaRPr lang="en-US" dirty="0"/>
           </a:p>
@@ -3447,7 +3447,7 @@
             <a:fld id="{B61BEF0D-F0BB-DE4B-95CE-6DB70DBA9567}" type="datetimeFigureOut">
               <a:rPr lang="en-US" dirty="0"/>
               <a:pPr/>
-              <a:t>4/22/2018</a:t>
+              <a:t>4/23/2018</a:t>
             </a:fld>
             <a:endParaRPr lang="en-US" dirty="0"/>
           </a:p>
@@ -3741,7 +3741,7 @@
           <a:p>
             <a:fld id="{05BFA754-D5C3-4E66-96A6-867B257F58DC}" type="datetimeFigureOut">
               <a:rPr lang="en-US" dirty="0"/>
-              <a:t>4/22/2018</a:t>
+              <a:t>4/23/2018</a:t>
             </a:fld>
             <a:endParaRPr lang="en-US" dirty="0"/>
           </a:p>
@@ -4131,7 +4131,7 @@
             <a:fld id="{B61BEF0D-F0BB-DE4B-95CE-6DB70DBA9567}" type="datetimeFigureOut">
               <a:rPr lang="en-US" dirty="0"/>
               <a:pPr/>
-              <a:t>4/22/2018</a:t>
+              <a:t>4/23/2018</a:t>
             </a:fld>
             <a:endParaRPr lang="en-US" dirty="0"/>
           </a:p>
@@ -4277,7 +4277,7 @@
             <a:fld id="{B61BEF0D-F0BB-DE4B-95CE-6DB70DBA9567}" type="datetimeFigureOut">
               <a:rPr lang="en-US" dirty="0"/>
               <a:pPr/>
-              <a:t>4/22/2018</a:t>
+              <a:t>4/23/2018</a:t>
             </a:fld>
             <a:endParaRPr lang="en-US" dirty="0"/>
           </a:p>
@@ -4400,7 +4400,7 @@
             <a:fld id="{B61BEF0D-F0BB-DE4B-95CE-6DB70DBA9567}" type="datetimeFigureOut">
               <a:rPr lang="en-US" dirty="0"/>
               <a:pPr/>
-              <a:t>4/22/2018</a:t>
+              <a:t>4/23/2018</a:t>
             </a:fld>
             <a:endParaRPr lang="en-US" dirty="0"/>
           </a:p>
@@ -4652,7 +4652,7 @@
             <a:fld id="{B61BEF0D-F0BB-DE4B-95CE-6DB70DBA9567}" type="datetimeFigureOut">
               <a:rPr lang="en-US" dirty="0"/>
               <a:pPr/>
-              <a:t>4/22/2018</a:t>
+              <a:t>4/23/2018</a:t>
             </a:fld>
             <a:endParaRPr lang="en-US" dirty="0"/>
           </a:p>
@@ -4964,7 +4964,7 @@
             <a:fld id="{B61BEF0D-F0BB-DE4B-95CE-6DB70DBA9567}" type="datetimeFigureOut">
               <a:rPr lang="en-US" dirty="0"/>
               <a:pPr/>
-              <a:t>4/22/2018</a:t>
+              <a:t>4/23/2018</a:t>
             </a:fld>
             <a:endParaRPr lang="en-US" dirty="0"/>
           </a:p>
@@ -5312,7 +5312,7 @@
             <a:fld id="{B61BEF0D-F0BB-DE4B-95CE-6DB70DBA9567}" type="datetimeFigureOut">
               <a:rPr lang="en-US" dirty="0"/>
               <a:pPr/>
-              <a:t>4/22/2018</a:t>
+              <a:t>4/23/2018</a:t>
             </a:fld>
             <a:endParaRPr lang="en-US" dirty="0"/>
           </a:p>
@@ -21418,7 +21418,7 @@
                 <a:latin typeface="Times New Roman" panose="02020603050405020304" pitchFamily="18" charset="0"/>
                 <a:cs typeface="Times New Roman" panose="02020603050405020304" pitchFamily="18" charset="0"/>
               </a:rPr>
-              <a:t> (Internal Logical File</a:t>
+              <a:t> (Internal Logical File)</a:t>
             </a:r>
           </a:p>
         </p:txBody>
@@ -24922,8 +24922,8 @@
           </a:p>
         </p:txBody>
       </p:sp>
-      <mc:AlternateContent xmlns:mc="http://schemas.openxmlformats.org/markup-compatibility/2006">
-        <mc:Choice xmlns:a14="http://schemas.microsoft.com/office/drawing/2010/main" Requires="a14">
+      <mc:AlternateContent xmlns:mc="http://schemas.openxmlformats.org/markup-compatibility/2006" xmlns:a14="http://schemas.microsoft.com/office/drawing/2010/main">
+        <mc:Choice Requires="a14">
           <p:sp>
             <p:nvSpPr>
               <p:cNvPr id="9" name="Content Placeholder 2">
@@ -25857,7 +25857,7 @@
             </p:txBody>
           </p:sp>
         </mc:Choice>
-        <mc:Fallback>
+        <mc:Fallback xmlns="">
           <p:sp>
             <p:nvSpPr>
               <p:cNvPr id="9" name="Content Placeholder 2">
@@ -26349,8 +26349,8 @@
           </a:p>
         </p:txBody>
       </p:sp>
-      <mc:AlternateContent xmlns:mc="http://schemas.openxmlformats.org/markup-compatibility/2006">
-        <mc:Choice xmlns:a14="http://schemas.microsoft.com/office/drawing/2010/main" Requires="a14">
+      <mc:AlternateContent xmlns:mc="http://schemas.openxmlformats.org/markup-compatibility/2006" xmlns:a14="http://schemas.microsoft.com/office/drawing/2010/main">
+        <mc:Choice Requires="a14">
           <p:sp>
             <p:nvSpPr>
               <p:cNvPr id="8" name="Content Placeholder 2">
@@ -26765,7 +26765,7 @@
             </p:txBody>
           </p:sp>
         </mc:Choice>
-        <mc:Fallback>
+        <mc:Fallback xmlns="">
           <p:sp>
             <p:nvSpPr>
               <p:cNvPr id="8" name="Content Placeholder 2">
@@ -29488,8 +29488,8 @@
           </a:p>
         </p:txBody>
       </p:sp>
-      <mc:AlternateContent xmlns:mc="http://schemas.openxmlformats.org/markup-compatibility/2006">
-        <mc:Choice xmlns:a14="http://schemas.microsoft.com/office/drawing/2010/main" Requires="a14">
+      <mc:AlternateContent xmlns:mc="http://schemas.openxmlformats.org/markup-compatibility/2006" xmlns:a14="http://schemas.microsoft.com/office/drawing/2010/main">
+        <mc:Choice Requires="a14">
           <p:sp>
             <p:nvSpPr>
               <p:cNvPr id="10" name="Content Placeholder 2">
@@ -30038,7 +30038,7 @@
             </p:txBody>
           </p:sp>
         </mc:Choice>
-        <mc:Fallback>
+        <mc:Fallback xmlns="">
           <p:sp>
             <p:nvSpPr>
               <p:cNvPr id="10" name="Content Placeholder 2">

</xml_diff>